<commit_message>
Forgot to save ppt
</commit_message>
<xml_diff>
--- a/Similarity in Ejecta Velocity Of Type Ia Supernovae.pptx
+++ b/Similarity in Ejecta Velocity Of Type Ia Supernovae.pptx
@@ -11402,7 +11402,7 @@
         <p:spPr>
           <a:xfrm>
             <a:off x="914400" y="1322614"/>
-            <a:ext cx="5927271" cy="3416320"/>
+            <a:ext cx="5927271" cy="3785652"/>
           </a:xfrm>
           <a:prstGeom prst="rect">
             <a:avLst/>
@@ -11453,7 +11453,7 @@
                   <a:schemeClr val="bg1"/>
                 </a:solidFill>
               </a:rPr>
-              <a:t>Use to find </a:t>
+              <a:t>Use to find variance and center of the velocity distribution</a:t>
             </a:r>
           </a:p>
           <a:p>
@@ -11490,15 +11490,15 @@
         </p:nvPicPr>
         <p:blipFill>
           <a:blip r:embed="rId2"/>
-          <a:srcRect l="7825" r="7775" b="1467"/>
+          <a:srcRect l="8379" t="1257" r="8237" b="2042"/>
           <a:stretch>
             <a:fillRect/>
           </a:stretch>
         </p:blipFill>
         <p:spPr>
           <a:xfrm>
-            <a:off x="6651058" y="1353896"/>
-            <a:ext cx="5399772" cy="4727967"/>
+            <a:off x="6841671" y="1322614"/>
+            <a:ext cx="5159829" cy="4400550"/>
           </a:xfrm>
           <a:prstGeom prst="roundRect">
             <a:avLst>

</xml_diff>

<commit_message>
So many last minute changes...
</commit_message>
<xml_diff>
--- a/Similarity in Ejecta Velocity Of Type Ia Supernovae.pptx
+++ b/Similarity in Ejecta Velocity Of Type Ia Supernovae.pptx
@@ -11402,7 +11402,7 @@
         <p:spPr>
           <a:xfrm>
             <a:off x="914400" y="1322614"/>
-            <a:ext cx="5927271" cy="3785652"/>
+            <a:ext cx="5927271" cy="3416320"/>
           </a:xfrm>
           <a:prstGeom prst="rect">
             <a:avLst/>
@@ -11439,7 +11439,7 @@
                   <a:schemeClr val="bg1"/>
                 </a:solidFill>
               </a:rPr>
-              <a:t>Since some Si II lines have been incorrectly identified, use K-Means Clustering to identify potentially incorrect classifications</a:t>
+              <a:t>Since some Si II lines have been incorrectly identified, try K-Means Clustering to identify potentially incorrect classifications</a:t>
             </a:r>
           </a:p>
           <a:p>
@@ -11455,14 +11455,6 @@
               </a:rPr>
               <a:t>Use to find variance and center of the velocity distribution</a:t>
             </a:r>
-          </a:p>
-          <a:p>
-            <a:pPr lvl="1"/>
-            <a:endParaRPr lang="en-US" sz="2400" dirty="0">
-              <a:solidFill>
-                <a:schemeClr val="bg1"/>
-              </a:solidFill>
-            </a:endParaRPr>
           </a:p>
           <a:p>
             <a:pPr lvl="1"/>
@@ -11497,8 +11489,8 @@
         </p:blipFill>
         <p:spPr>
           <a:xfrm>
-            <a:off x="6841671" y="1322614"/>
-            <a:ext cx="5159829" cy="4400550"/>
+            <a:off x="7005997" y="1228725"/>
+            <a:ext cx="5088032" cy="4339318"/>
           </a:xfrm>
           <a:prstGeom prst="roundRect">
             <a:avLst>
@@ -11507,6 +11499,849 @@
           </a:prstGeom>
         </p:spPr>
       </p:pic>
+      <mc:AlternateContent xmlns:mc="http://schemas.openxmlformats.org/markup-compatibility/2006">
+        <mc:Choice xmlns:a14="http://schemas.microsoft.com/office/drawing/2010/main" Requires="a14">
+          <p:sp>
+            <p:nvSpPr>
+              <p:cNvPr id="13" name="TextBox 12">
+                <a:extLst>
+                  <a:ext uri="{FF2B5EF4-FFF2-40B4-BE49-F238E27FC236}">
+                    <a16:creationId xmlns:a16="http://schemas.microsoft.com/office/drawing/2014/main" id="{4CCA4AB5-EB50-18D1-2740-E885F3998DA7}"/>
+                  </a:ext>
+                </a:extLst>
+              </p:cNvPr>
+              <p:cNvSpPr txBox="1"/>
+              <p:nvPr/>
+            </p:nvSpPr>
+            <p:spPr>
+              <a:xfrm>
+                <a:off x="820510" y="4738934"/>
+                <a:ext cx="6555921" cy="1501052"/>
+              </a:xfrm>
+              <a:prstGeom prst="rect">
+                <a:avLst/>
+              </a:prstGeom>
+              <a:noFill/>
+            </p:spPr>
+            <p:txBody>
+              <a:bodyPr wrap="square">
+                <a:spAutoFit/>
+              </a:bodyPr>
+              <a:lstStyle/>
+              <a:p>
+                <a:pPr lvl="1"/>
+                <a14:m>
+                  <m:oMathPara xmlns:m="http://schemas.openxmlformats.org/officeDocument/2006/math">
+                    <m:oMathParaPr>
+                      <m:jc m:val="left"/>
+                    </m:oMathParaPr>
+                    <m:oMath xmlns:m="http://schemas.openxmlformats.org/officeDocument/2006/math">
+                      <m:r>
+                        <a:rPr lang="en-US" sz="1800" b="0" i="1" smtClean="0">
+                          <a:solidFill>
+                            <a:schemeClr val="bg1"/>
+                          </a:solidFill>
+                          <a:latin typeface="Cambria Math" panose="02040503050406030204" pitchFamily="18" charset="0"/>
+                        </a:rPr>
+                        <m:t>𝑃</m:t>
+                      </m:r>
+                      <m:r>
+                        <a:rPr lang="en-US" sz="1800" b="0" i="1" smtClean="0">
+                          <a:solidFill>
+                            <a:schemeClr val="bg1"/>
+                          </a:solidFill>
+                          <a:latin typeface="Cambria Math" panose="02040503050406030204" pitchFamily="18" charset="0"/>
+                        </a:rPr>
+                        <m:t>=</m:t>
+                      </m:r>
+                      <m:d>
+                        <m:dPr>
+                          <m:begChr m:val="{"/>
+                          <m:endChr m:val=""/>
+                          <m:ctrlPr>
+                            <a:rPr lang="en-US" sz="1800" b="0" i="1" smtClean="0">
+                              <a:solidFill>
+                                <a:schemeClr val="bg1"/>
+                              </a:solidFill>
+                              <a:latin typeface="Cambria Math" panose="02040503050406030204" pitchFamily="18" charset="0"/>
+                            </a:rPr>
+                          </m:ctrlPr>
+                        </m:dPr>
+                        <m:e>
+                          <m:eqArr>
+                            <m:eqArrPr>
+                              <m:ctrlPr>
+                                <a:rPr lang="en-US" i="1">
+                                  <a:solidFill>
+                                    <a:schemeClr val="bg1"/>
+                                  </a:solidFill>
+                                  <a:latin typeface="Cambria Math" panose="02040503050406030204" pitchFamily="18" charset="0"/>
+                                </a:rPr>
+                              </m:ctrlPr>
+                            </m:eqArrPr>
+                            <m:e>
+                              <m:f>
+                                <m:fPr>
+                                  <m:ctrlPr>
+                                    <a:rPr lang="en-US" i="1">
+                                      <a:solidFill>
+                                        <a:schemeClr val="bg1"/>
+                                      </a:solidFill>
+                                      <a:latin typeface="Cambria Math" panose="02040503050406030204" pitchFamily="18" charset="0"/>
+                                    </a:rPr>
+                                  </m:ctrlPr>
+                                </m:fPr>
+                                <m:num>
+                                  <m:r>
+                                    <a:rPr lang="en-US" i="1">
+                                      <a:solidFill>
+                                        <a:schemeClr val="bg1"/>
+                                      </a:solidFill>
+                                      <a:latin typeface="Cambria Math" panose="02040503050406030204" pitchFamily="18" charset="0"/>
+                                    </a:rPr>
+                                    <m:t>2</m:t>
+                                  </m:r>
+                                </m:num>
+                                <m:den>
+                                  <m:rad>
+                                    <m:radPr>
+                                      <m:degHide m:val="on"/>
+                                      <m:ctrlPr>
+                                        <a:rPr lang="en-US" i="1">
+                                          <a:solidFill>
+                                            <a:schemeClr val="bg1"/>
+                                          </a:solidFill>
+                                          <a:latin typeface="Cambria Math" panose="02040503050406030204" pitchFamily="18" charset="0"/>
+                                        </a:rPr>
+                                      </m:ctrlPr>
+                                    </m:radPr>
+                                    <m:deg/>
+                                    <m:e>
+                                      <m:r>
+                                        <a:rPr lang="en-US" i="1">
+                                          <a:solidFill>
+                                            <a:schemeClr val="bg1"/>
+                                          </a:solidFill>
+                                          <a:latin typeface="Cambria Math" panose="02040503050406030204" pitchFamily="18" charset="0"/>
+                                        </a:rPr>
+                                        <m:t>2</m:t>
+                                      </m:r>
+                                      <m:r>
+                                        <a:rPr lang="en-US" i="1">
+                                          <a:solidFill>
+                                            <a:schemeClr val="bg1"/>
+                                          </a:solidFill>
+                                          <a:latin typeface="Cambria Math" panose="02040503050406030204" pitchFamily="18" charset="0"/>
+                                        </a:rPr>
+                                        <m:t>𝜋</m:t>
+                                      </m:r>
+                                    </m:e>
+                                  </m:rad>
+                                  <m:r>
+                                    <a:rPr lang="en-US" i="1">
+                                      <a:solidFill>
+                                        <a:schemeClr val="bg1"/>
+                                      </a:solidFill>
+                                      <a:latin typeface="Cambria Math" panose="02040503050406030204" pitchFamily="18" charset="0"/>
+                                    </a:rPr>
+                                    <m:t> </m:t>
+                                  </m:r>
+                                  <m:sSub>
+                                    <m:sSubPr>
+                                      <m:ctrlPr>
+                                        <a:rPr lang="en-US" b="0" i="1" smtClean="0">
+                                          <a:solidFill>
+                                            <a:schemeClr val="bg1"/>
+                                          </a:solidFill>
+                                          <a:latin typeface="Cambria Math" panose="02040503050406030204" pitchFamily="18" charset="0"/>
+                                        </a:rPr>
+                                      </m:ctrlPr>
+                                    </m:sSubPr>
+                                    <m:e>
+                                      <m:r>
+                                        <a:rPr lang="en-US" i="1">
+                                          <a:solidFill>
+                                            <a:schemeClr val="bg1"/>
+                                          </a:solidFill>
+                                          <a:latin typeface="Cambria Math" panose="02040503050406030204" pitchFamily="18" charset="0"/>
+                                        </a:rPr>
+                                        <m:t>𝜎</m:t>
+                                      </m:r>
+                                    </m:e>
+                                    <m:sub>
+                                      <m:r>
+                                        <a:rPr lang="en-US" b="0" i="1" smtClean="0">
+                                          <a:solidFill>
+                                            <a:schemeClr val="bg1"/>
+                                          </a:solidFill>
+                                          <a:latin typeface="Cambria Math" panose="02040503050406030204" pitchFamily="18" charset="0"/>
+                                        </a:rPr>
+                                        <m:t>𝑧</m:t>
+                                      </m:r>
+                                    </m:sub>
+                                  </m:sSub>
+                                </m:den>
+                              </m:f>
+                              <m:sSup>
+                                <m:sSupPr>
+                                  <m:ctrlPr>
+                                    <a:rPr lang="en-US" b="0" i="1" smtClean="0">
+                                      <a:solidFill>
+                                        <a:schemeClr val="bg1"/>
+                                      </a:solidFill>
+                                      <a:latin typeface="Cambria Math" panose="02040503050406030204" pitchFamily="18" charset="0"/>
+                                    </a:rPr>
+                                  </m:ctrlPr>
+                                </m:sSupPr>
+                                <m:e>
+                                  <m:r>
+                                    <a:rPr lang="en-US" b="0" i="1" smtClean="0">
+                                      <a:solidFill>
+                                        <a:schemeClr val="bg1"/>
+                                      </a:solidFill>
+                                      <a:latin typeface="Cambria Math" panose="02040503050406030204" pitchFamily="18" charset="0"/>
+                                    </a:rPr>
+                                    <m:t>𝑒</m:t>
+                                  </m:r>
+                                </m:e>
+                                <m:sup>
+                                  <m:r>
+                                    <a:rPr lang="en-US" b="0" i="1" smtClean="0">
+                                      <a:solidFill>
+                                        <a:schemeClr val="bg1"/>
+                                      </a:solidFill>
+                                      <a:latin typeface="Cambria Math" panose="02040503050406030204" pitchFamily="18" charset="0"/>
+                                    </a:rPr>
+                                    <m:t>−</m:t>
+                                  </m:r>
+                                  <m:f>
+                                    <m:fPr>
+                                      <m:ctrlPr>
+                                        <a:rPr lang="en-US" b="0" i="1" smtClean="0">
+                                          <a:solidFill>
+                                            <a:schemeClr val="bg1"/>
+                                          </a:solidFill>
+                                          <a:latin typeface="Cambria Math" panose="02040503050406030204" pitchFamily="18" charset="0"/>
+                                        </a:rPr>
+                                      </m:ctrlPr>
+                                    </m:fPr>
+                                    <m:num>
+                                      <m:sSup>
+                                        <m:sSupPr>
+                                          <m:ctrlPr>
+                                            <a:rPr lang="en-US" b="0" i="1" smtClean="0">
+                                              <a:solidFill>
+                                                <a:schemeClr val="bg1"/>
+                                              </a:solidFill>
+                                              <a:latin typeface="Cambria Math" panose="02040503050406030204" pitchFamily="18" charset="0"/>
+                                            </a:rPr>
+                                          </m:ctrlPr>
+                                        </m:sSupPr>
+                                        <m:e>
+                                          <m:d>
+                                            <m:dPr>
+                                              <m:ctrlPr>
+                                                <a:rPr lang="en-US" b="0" i="1" smtClean="0">
+                                                  <a:solidFill>
+                                                    <a:schemeClr val="bg1"/>
+                                                  </a:solidFill>
+                                                  <a:latin typeface="Cambria Math" panose="02040503050406030204" pitchFamily="18" charset="0"/>
+                                                </a:rPr>
+                                              </m:ctrlPr>
+                                            </m:dPr>
+                                            <m:e>
+                                              <m:r>
+                                                <a:rPr lang="en-US" b="0" i="1" smtClean="0">
+                                                  <a:solidFill>
+                                                    <a:schemeClr val="bg1"/>
+                                                  </a:solidFill>
+                                                  <a:latin typeface="Cambria Math" panose="02040503050406030204" pitchFamily="18" charset="0"/>
+                                                </a:rPr>
+                                                <m:t>𝑧</m:t>
+                                              </m:r>
+                                              <m:r>
+                                                <a:rPr lang="en-US" b="0" i="1" smtClean="0">
+                                                  <a:solidFill>
+                                                    <a:schemeClr val="bg1"/>
+                                                  </a:solidFill>
+                                                  <a:latin typeface="Cambria Math" panose="02040503050406030204" pitchFamily="18" charset="0"/>
+                                                </a:rPr>
+                                                <m:t>−</m:t>
+                                              </m:r>
+                                              <m:sSub>
+                                                <m:sSubPr>
+                                                  <m:ctrlPr>
+                                                    <a:rPr lang="en-US" b="0" i="1" smtClean="0">
+                                                      <a:solidFill>
+                                                        <a:schemeClr val="bg1"/>
+                                                      </a:solidFill>
+                                                      <a:latin typeface="Cambria Math" panose="02040503050406030204" pitchFamily="18" charset="0"/>
+                                                    </a:rPr>
+                                                  </m:ctrlPr>
+                                                </m:sSubPr>
+                                                <m:e>
+                                                  <m:r>
+                                                    <a:rPr lang="en-US" b="0" i="1" smtClean="0">
+                                                      <a:solidFill>
+                                                        <a:schemeClr val="bg1"/>
+                                                      </a:solidFill>
+                                                      <a:latin typeface="Cambria Math" panose="02040503050406030204" pitchFamily="18" charset="0"/>
+                                                    </a:rPr>
+                                                    <m:t>𝑧</m:t>
+                                                  </m:r>
+                                                </m:e>
+                                                <m:sub>
+                                                  <m:r>
+                                                    <a:rPr lang="en-US" b="0" i="1" smtClean="0">
+                                                      <a:solidFill>
+                                                        <a:schemeClr val="bg1"/>
+                                                      </a:solidFill>
+                                                      <a:latin typeface="Cambria Math" panose="02040503050406030204" pitchFamily="18" charset="0"/>
+                                                    </a:rPr>
+                                                    <m:t>𝑏𝑒𝑠𝑡</m:t>
+                                                  </m:r>
+                                                </m:sub>
+                                              </m:sSub>
+                                            </m:e>
+                                          </m:d>
+                                        </m:e>
+                                        <m:sup>
+                                          <m:r>
+                                            <a:rPr lang="en-US" b="0" i="1" smtClean="0">
+                                              <a:solidFill>
+                                                <a:schemeClr val="bg1"/>
+                                              </a:solidFill>
+                                              <a:latin typeface="Cambria Math" panose="02040503050406030204" pitchFamily="18" charset="0"/>
+                                            </a:rPr>
+                                            <m:t>2</m:t>
+                                          </m:r>
+                                        </m:sup>
+                                      </m:sSup>
+                                    </m:num>
+                                    <m:den>
+                                      <m:r>
+                                        <a:rPr lang="en-US" b="0" i="1" smtClean="0">
+                                          <a:solidFill>
+                                            <a:schemeClr val="bg1"/>
+                                          </a:solidFill>
+                                          <a:latin typeface="Cambria Math" panose="02040503050406030204" pitchFamily="18" charset="0"/>
+                                        </a:rPr>
+                                        <m:t>2</m:t>
+                                      </m:r>
+                                      <m:sSubSup>
+                                        <m:sSubSupPr>
+                                          <m:ctrlPr>
+                                            <a:rPr lang="en-US" b="0" i="1" smtClean="0">
+                                              <a:solidFill>
+                                                <a:schemeClr val="bg1"/>
+                                              </a:solidFill>
+                                              <a:latin typeface="Cambria Math" panose="02040503050406030204" pitchFamily="18" charset="0"/>
+                                            </a:rPr>
+                                          </m:ctrlPr>
+                                        </m:sSubSupPr>
+                                        <m:e>
+                                          <m:r>
+                                            <a:rPr lang="en-US" b="0" i="1" smtClean="0">
+                                              <a:solidFill>
+                                                <a:schemeClr val="bg1"/>
+                                              </a:solidFill>
+                                              <a:latin typeface="Cambria Math" panose="02040503050406030204" pitchFamily="18" charset="0"/>
+                                            </a:rPr>
+                                            <m:t>𝜎</m:t>
+                                          </m:r>
+                                        </m:e>
+                                        <m:sub>
+                                          <m:r>
+                                            <a:rPr lang="en-US" b="0" i="1" smtClean="0">
+                                              <a:solidFill>
+                                                <a:schemeClr val="bg1"/>
+                                              </a:solidFill>
+                                              <a:latin typeface="Cambria Math" panose="02040503050406030204" pitchFamily="18" charset="0"/>
+                                            </a:rPr>
+                                            <m:t>𝑧</m:t>
+                                          </m:r>
+                                        </m:sub>
+                                        <m:sup>
+                                          <m:r>
+                                            <a:rPr lang="en-US" b="0" i="1" smtClean="0">
+                                              <a:solidFill>
+                                                <a:schemeClr val="bg1"/>
+                                              </a:solidFill>
+                                              <a:latin typeface="Cambria Math" panose="02040503050406030204" pitchFamily="18" charset="0"/>
+                                            </a:rPr>
+                                            <m:t>2</m:t>
+                                          </m:r>
+                                        </m:sup>
+                                      </m:sSubSup>
+                                    </m:den>
+                                  </m:f>
+                                  <m:r>
+                                    <a:rPr lang="en-US" b="0" i="1" smtClean="0">
+                                      <a:solidFill>
+                                        <a:schemeClr val="bg1"/>
+                                      </a:solidFill>
+                                      <a:latin typeface="Cambria Math" panose="02040503050406030204" pitchFamily="18" charset="0"/>
+                                    </a:rPr>
+                                    <m:t> </m:t>
+                                  </m:r>
+                                </m:sup>
+                              </m:sSup>
+                              <m:r>
+                                <a:rPr lang="en-US" b="0" i="1" smtClean="0">
+                                  <a:solidFill>
+                                    <a:schemeClr val="bg1"/>
+                                  </a:solidFill>
+                                  <a:latin typeface="Cambria Math" panose="02040503050406030204" pitchFamily="18" charset="0"/>
+                                </a:rPr>
+                                <m:t>,                                   </m:t>
+                              </m:r>
+                              <m:r>
+                                <a:rPr lang="en-US" i="1">
+                                  <a:solidFill>
+                                    <a:schemeClr val="bg1"/>
+                                  </a:solidFill>
+                                  <a:latin typeface="Cambria Math" panose="02040503050406030204" pitchFamily="18" charset="0"/>
+                                </a:rPr>
+                                <m:t>𝑧</m:t>
+                              </m:r>
+                              <m:r>
+                                <a:rPr lang="en-US" b="0" i="1" smtClean="0">
+                                  <a:solidFill>
+                                    <a:schemeClr val="bg1"/>
+                                  </a:solidFill>
+                                  <a:latin typeface="Cambria Math" panose="02040503050406030204" pitchFamily="18" charset="0"/>
+                                </a:rPr>
+                                <m:t>≤</m:t>
+                              </m:r>
+                              <m:sSub>
+                                <m:sSubPr>
+                                  <m:ctrlPr>
+                                    <a:rPr lang="en-US" i="1">
+                                      <a:solidFill>
+                                        <a:schemeClr val="bg1"/>
+                                      </a:solidFill>
+                                      <a:latin typeface="Cambria Math" panose="02040503050406030204" pitchFamily="18" charset="0"/>
+                                    </a:rPr>
+                                  </m:ctrlPr>
+                                </m:sSubPr>
+                                <m:e>
+                                  <m:r>
+                                    <a:rPr lang="en-US" i="1">
+                                      <a:solidFill>
+                                        <a:schemeClr val="bg1"/>
+                                      </a:solidFill>
+                                      <a:latin typeface="Cambria Math" panose="02040503050406030204" pitchFamily="18" charset="0"/>
+                                    </a:rPr>
+                                    <m:t>𝑧</m:t>
+                                  </m:r>
+                                </m:e>
+                                <m:sub>
+                                  <m:r>
+                                    <a:rPr lang="en-US" i="1">
+                                      <a:solidFill>
+                                        <a:schemeClr val="bg1"/>
+                                      </a:solidFill>
+                                      <a:latin typeface="Cambria Math" panose="02040503050406030204" pitchFamily="18" charset="0"/>
+                                    </a:rPr>
+                                    <m:t>𝑏𝑒𝑠𝑡</m:t>
+                                  </m:r>
+                                </m:sub>
+                              </m:sSub>
+                            </m:e>
+                            <m:e>
+                              <m:f>
+                                <m:fPr>
+                                  <m:ctrlPr>
+                                    <a:rPr lang="en-US" i="1" smtClean="0">
+                                      <a:solidFill>
+                                        <a:schemeClr val="bg1"/>
+                                      </a:solidFill>
+                                      <a:latin typeface="Cambria Math" panose="02040503050406030204" pitchFamily="18" charset="0"/>
+                                    </a:rPr>
+                                  </m:ctrlPr>
+                                </m:fPr>
+                                <m:num>
+                                  <m:r>
+                                    <a:rPr lang="en-US" b="0" i="1" smtClean="0">
+                                      <a:solidFill>
+                                        <a:schemeClr val="bg1"/>
+                                      </a:solidFill>
+                                      <a:latin typeface="Cambria Math" panose="02040503050406030204" pitchFamily="18" charset="0"/>
+                                    </a:rPr>
+                                    <m:t>1</m:t>
+                                  </m:r>
+                                </m:num>
+                                <m:den>
+                                  <m:rad>
+                                    <m:radPr>
+                                      <m:degHide m:val="on"/>
+                                      <m:ctrlPr>
+                                        <a:rPr lang="en-US" i="1" smtClean="0">
+                                          <a:solidFill>
+                                            <a:schemeClr val="bg1"/>
+                                          </a:solidFill>
+                                          <a:latin typeface="Cambria Math" panose="02040503050406030204" pitchFamily="18" charset="0"/>
+                                        </a:rPr>
+                                      </m:ctrlPr>
+                                    </m:radPr>
+                                    <m:deg/>
+                                    <m:e>
+                                      <m:r>
+                                        <a:rPr lang="en-US" b="0" i="1" smtClean="0">
+                                          <a:solidFill>
+                                            <a:schemeClr val="bg1"/>
+                                          </a:solidFill>
+                                          <a:latin typeface="Cambria Math" panose="02040503050406030204" pitchFamily="18" charset="0"/>
+                                        </a:rPr>
+                                        <m:t>2</m:t>
+                                      </m:r>
+                                      <m:r>
+                                        <a:rPr lang="en-US" b="0" i="1" smtClean="0">
+                                          <a:solidFill>
+                                            <a:schemeClr val="bg1"/>
+                                          </a:solidFill>
+                                          <a:latin typeface="Cambria Math" panose="02040503050406030204" pitchFamily="18" charset="0"/>
+                                        </a:rPr>
+                                        <m:t>𝜋</m:t>
+                                      </m:r>
+                                    </m:e>
+                                  </m:rad>
+                                  <m:r>
+                                    <a:rPr lang="en-US" b="0" i="1" smtClean="0">
+                                      <a:solidFill>
+                                        <a:schemeClr val="bg1"/>
+                                      </a:solidFill>
+                                      <a:latin typeface="Cambria Math" panose="02040503050406030204" pitchFamily="18" charset="0"/>
+                                    </a:rPr>
+                                    <m:t> </m:t>
+                                  </m:r>
+                                  <m:sSub>
+                                    <m:sSubPr>
+                                      <m:ctrlPr>
+                                        <a:rPr lang="en-US" b="0" i="1" smtClean="0">
+                                          <a:solidFill>
+                                            <a:schemeClr val="bg1"/>
+                                          </a:solidFill>
+                                          <a:latin typeface="Cambria Math" panose="02040503050406030204" pitchFamily="18" charset="0"/>
+                                        </a:rPr>
+                                      </m:ctrlPr>
+                                    </m:sSubPr>
+                                    <m:e>
+                                      <m:r>
+                                        <a:rPr lang="en-US" b="0" i="1" smtClean="0">
+                                          <a:solidFill>
+                                            <a:schemeClr val="bg1"/>
+                                          </a:solidFill>
+                                          <a:latin typeface="Cambria Math" panose="02040503050406030204" pitchFamily="18" charset="0"/>
+                                        </a:rPr>
+                                        <m:t>𝜎</m:t>
+                                      </m:r>
+                                    </m:e>
+                                    <m:sub>
+                                      <m:r>
+                                        <a:rPr lang="en-US" b="0" i="1" smtClean="0">
+                                          <a:solidFill>
+                                            <a:schemeClr val="bg1"/>
+                                          </a:solidFill>
+                                          <a:latin typeface="Cambria Math" panose="02040503050406030204" pitchFamily="18" charset="0"/>
+                                        </a:rPr>
+                                        <m:t>𝑧</m:t>
+                                      </m:r>
+                                    </m:sub>
+                                  </m:sSub>
+                                </m:den>
+                              </m:f>
+                              <m:d>
+                                <m:dPr>
+                                  <m:ctrlPr>
+                                    <a:rPr lang="en-US" i="1" smtClean="0">
+                                      <a:solidFill>
+                                        <a:schemeClr val="bg1"/>
+                                      </a:solidFill>
+                                      <a:latin typeface="Cambria Math" panose="02040503050406030204" pitchFamily="18" charset="0"/>
+                                    </a:rPr>
+                                  </m:ctrlPr>
+                                </m:dPr>
+                                <m:e>
+                                  <m:r>
+                                    <a:rPr lang="en-US" b="0" i="1" smtClean="0">
+                                      <a:solidFill>
+                                        <a:schemeClr val="bg1"/>
+                                      </a:solidFill>
+                                      <a:latin typeface="Cambria Math" panose="02040503050406030204" pitchFamily="18" charset="0"/>
+                                    </a:rPr>
+                                    <m:t>1−</m:t>
+                                  </m:r>
+                                  <m:func>
+                                    <m:funcPr>
+                                      <m:ctrlPr>
+                                        <a:rPr lang="en-US" b="0" i="1" smtClean="0">
+                                          <a:solidFill>
+                                            <a:schemeClr val="bg1"/>
+                                          </a:solidFill>
+                                          <a:latin typeface="Cambria Math" panose="02040503050406030204" pitchFamily="18" charset="0"/>
+                                        </a:rPr>
+                                      </m:ctrlPr>
+                                    </m:funcPr>
+                                    <m:fName>
+                                      <m:r>
+                                        <m:rPr>
+                                          <m:sty m:val="p"/>
+                                        </m:rPr>
+                                        <a:rPr lang="en-US" b="0" i="0" smtClean="0">
+                                          <a:solidFill>
+                                            <a:schemeClr val="bg1"/>
+                                          </a:solidFill>
+                                          <a:latin typeface="Cambria Math" panose="02040503050406030204" pitchFamily="18" charset="0"/>
+                                        </a:rPr>
+                                        <m:t>tanh</m:t>
+                                      </m:r>
+                                    </m:fName>
+                                    <m:e>
+                                      <m:d>
+                                        <m:dPr>
+                                          <m:ctrlPr>
+                                            <a:rPr lang="en-US" b="0" i="1" smtClean="0">
+                                              <a:solidFill>
+                                                <a:schemeClr val="bg1"/>
+                                              </a:solidFill>
+                                              <a:latin typeface="Cambria Math" panose="02040503050406030204" pitchFamily="18" charset="0"/>
+                                            </a:rPr>
+                                          </m:ctrlPr>
+                                        </m:dPr>
+                                        <m:e>
+                                          <m:sSub>
+                                            <m:sSubPr>
+                                              <m:ctrlPr>
+                                                <a:rPr lang="en-US" b="0" i="1" smtClean="0">
+                                                  <a:solidFill>
+                                                    <a:schemeClr val="bg1"/>
+                                                  </a:solidFill>
+                                                  <a:latin typeface="Cambria Math" panose="02040503050406030204" pitchFamily="18" charset="0"/>
+                                                </a:rPr>
+                                              </m:ctrlPr>
+                                            </m:sSubPr>
+                                            <m:e>
+                                              <m:r>
+                                                <a:rPr lang="en-US" b="0" i="1" smtClean="0">
+                                                  <a:solidFill>
+                                                    <a:schemeClr val="bg1"/>
+                                                  </a:solidFill>
+                                                  <a:latin typeface="Cambria Math" panose="02040503050406030204" pitchFamily="18" charset="0"/>
+                                                </a:rPr>
+                                                <m:t>𝜎</m:t>
+                                              </m:r>
+                                            </m:e>
+                                            <m:sub>
+                                              <m:r>
+                                                <a:rPr lang="en-US" b="0" i="1" smtClean="0">
+                                                  <a:solidFill>
+                                                    <a:schemeClr val="bg1"/>
+                                                  </a:solidFill>
+                                                  <a:latin typeface="Cambria Math" panose="02040503050406030204" pitchFamily="18" charset="0"/>
+                                                </a:rPr>
+                                                <m:t>𝑒</m:t>
+                                              </m:r>
+                                            </m:sub>
+                                          </m:sSub>
+                                          <m:r>
+                                            <a:rPr lang="en-US" b="0" i="1" smtClean="0">
+                                              <a:solidFill>
+                                                <a:schemeClr val="bg1"/>
+                                              </a:solidFill>
+                                              <a:latin typeface="Cambria Math" panose="02040503050406030204" pitchFamily="18" charset="0"/>
+                                            </a:rPr>
+                                            <m:t>(</m:t>
+                                          </m:r>
+                                          <m:r>
+                                            <a:rPr lang="en-US" b="0" i="1" smtClean="0">
+                                              <a:solidFill>
+                                                <a:schemeClr val="bg1"/>
+                                              </a:solidFill>
+                                              <a:latin typeface="Cambria Math" panose="02040503050406030204" pitchFamily="18" charset="0"/>
+                                            </a:rPr>
+                                            <m:t>𝑧</m:t>
+                                          </m:r>
+                                          <m:r>
+                                            <a:rPr lang="en-US" b="0" i="1" smtClean="0">
+                                              <a:solidFill>
+                                                <a:schemeClr val="bg1"/>
+                                              </a:solidFill>
+                                              <a:latin typeface="Cambria Math" panose="02040503050406030204" pitchFamily="18" charset="0"/>
+                                            </a:rPr>
+                                            <m:t>−</m:t>
+                                          </m:r>
+                                          <m:sSub>
+                                            <m:sSubPr>
+                                              <m:ctrlPr>
+                                                <a:rPr lang="en-US" b="0" i="1" smtClean="0">
+                                                  <a:solidFill>
+                                                    <a:schemeClr val="bg1"/>
+                                                  </a:solidFill>
+                                                  <a:latin typeface="Cambria Math" panose="02040503050406030204" pitchFamily="18" charset="0"/>
+                                                </a:rPr>
+                                              </m:ctrlPr>
+                                            </m:sSubPr>
+                                            <m:e>
+                                              <m:r>
+                                                <a:rPr lang="en-US" b="0" i="1" smtClean="0">
+                                                  <a:solidFill>
+                                                    <a:schemeClr val="bg1"/>
+                                                  </a:solidFill>
+                                                  <a:latin typeface="Cambria Math" panose="02040503050406030204" pitchFamily="18" charset="0"/>
+                                                </a:rPr>
+                                                <m:t>𝑧</m:t>
+                                              </m:r>
+                                            </m:e>
+                                            <m:sub>
+                                              <m:r>
+                                                <a:rPr lang="en-US" b="0" i="1" smtClean="0">
+                                                  <a:solidFill>
+                                                    <a:schemeClr val="bg1"/>
+                                                  </a:solidFill>
+                                                  <a:latin typeface="Cambria Math" panose="02040503050406030204" pitchFamily="18" charset="0"/>
+                                                </a:rPr>
+                                                <m:t>𝑏𝑒𝑠𝑡</m:t>
+                                              </m:r>
+                                            </m:sub>
+                                          </m:sSub>
+                                        </m:e>
+                                      </m:d>
+                                      <m:r>
+                                        <a:rPr lang="en-US" b="0" i="1" smtClean="0">
+                                          <a:solidFill>
+                                            <a:schemeClr val="bg1"/>
+                                          </a:solidFill>
+                                          <a:latin typeface="Cambria Math" panose="02040503050406030204" pitchFamily="18" charset="0"/>
+                                        </a:rPr>
+                                        <m:t>−4</m:t>
+                                      </m:r>
+                                    </m:e>
+                                  </m:func>
+                                </m:e>
+                              </m:d>
+                              <m:r>
+                                <a:rPr lang="en-US" b="0" i="1" smtClean="0">
+                                  <a:solidFill>
+                                    <a:schemeClr val="bg1"/>
+                                  </a:solidFill>
+                                  <a:latin typeface="Cambria Math" panose="02040503050406030204" pitchFamily="18" charset="0"/>
+                                </a:rPr>
+                                <m:t>,  </m:t>
+                              </m:r>
+                              <m:r>
+                                <a:rPr lang="en-US" b="0" i="1" smtClean="0">
+                                  <a:solidFill>
+                                    <a:schemeClr val="bg1"/>
+                                  </a:solidFill>
+                                  <a:latin typeface="Cambria Math" panose="02040503050406030204" pitchFamily="18" charset="0"/>
+                                </a:rPr>
+                                <m:t>𝑧</m:t>
+                              </m:r>
+                              <m:r>
+                                <a:rPr lang="en-US" b="0" i="1" smtClean="0">
+                                  <a:solidFill>
+                                    <a:schemeClr val="bg1"/>
+                                  </a:solidFill>
+                                  <a:latin typeface="Cambria Math" panose="02040503050406030204" pitchFamily="18" charset="0"/>
+                                </a:rPr>
+                                <m:t>&gt;</m:t>
+                              </m:r>
+                              <m:sSub>
+                                <m:sSubPr>
+                                  <m:ctrlPr>
+                                    <a:rPr lang="en-US" b="0" i="1" smtClean="0">
+                                      <a:solidFill>
+                                        <a:schemeClr val="bg1"/>
+                                      </a:solidFill>
+                                      <a:latin typeface="Cambria Math" panose="02040503050406030204" pitchFamily="18" charset="0"/>
+                                    </a:rPr>
+                                  </m:ctrlPr>
+                                </m:sSubPr>
+                                <m:e>
+                                  <m:r>
+                                    <a:rPr lang="en-US" b="0" i="1" smtClean="0">
+                                      <a:solidFill>
+                                        <a:schemeClr val="bg1"/>
+                                      </a:solidFill>
+                                      <a:latin typeface="Cambria Math" panose="02040503050406030204" pitchFamily="18" charset="0"/>
+                                    </a:rPr>
+                                    <m:t>𝑧</m:t>
+                                  </m:r>
+                                </m:e>
+                                <m:sub>
+                                  <m:r>
+                                    <a:rPr lang="en-US" b="0" i="1" smtClean="0">
+                                      <a:solidFill>
+                                        <a:schemeClr val="bg1"/>
+                                      </a:solidFill>
+                                      <a:latin typeface="Cambria Math" panose="02040503050406030204" pitchFamily="18" charset="0"/>
+                                    </a:rPr>
+                                    <m:t>𝑏𝑒𝑠𝑡</m:t>
+                                  </m:r>
+                                </m:sub>
+                              </m:sSub>
+                            </m:e>
+                          </m:eqArr>
+                        </m:e>
+                      </m:d>
+                    </m:oMath>
+                  </m:oMathPara>
+                </a14:m>
+                <a:endParaRPr lang="en-US" sz="1800" dirty="0">
+                  <a:solidFill>
+                    <a:schemeClr val="bg1"/>
+                  </a:solidFill>
+                </a:endParaRPr>
+              </a:p>
+            </p:txBody>
+          </p:sp>
+        </mc:Choice>
+        <mc:Fallback>
+          <p:sp>
+            <p:nvSpPr>
+              <p:cNvPr id="13" name="TextBox 12">
+                <a:extLst>
+                  <a:ext uri="{FF2B5EF4-FFF2-40B4-BE49-F238E27FC236}">
+                    <a16:creationId xmlns:a16="http://schemas.microsoft.com/office/drawing/2014/main" id="{4CCA4AB5-EB50-18D1-2740-E885F3998DA7}"/>
+                  </a:ext>
+                </a:extLst>
+              </p:cNvPr>
+              <p:cNvSpPr txBox="1">
+                <a:spLocks noRot="1" noChangeAspect="1" noMove="1" noResize="1" noEditPoints="1" noAdjustHandles="1" noChangeArrowheads="1" noChangeShapeType="1" noTextEdit="1"/>
+              </p:cNvSpPr>
+              <p:nvPr/>
+            </p:nvSpPr>
+            <p:spPr>
+              <a:xfrm>
+                <a:off x="820510" y="4738934"/>
+                <a:ext cx="6555921" cy="1501052"/>
+              </a:xfrm>
+              <a:prstGeom prst="rect">
+                <a:avLst/>
+              </a:prstGeom>
+              <a:blipFill>
+                <a:blip r:embed="rId3"/>
+                <a:stretch>
+                  <a:fillRect/>
+                </a:stretch>
+              </a:blipFill>
+            </p:spPr>
+            <p:txBody>
+              <a:bodyPr/>
+              <a:lstStyle/>
+              <a:p>
+                <a:r>
+                  <a:rPr lang="en-US">
+                    <a:noFill/>
+                  </a:rPr>
+                  <a:t> </a:t>
+                </a:r>
+              </a:p>
+            </p:txBody>
+          </p:sp>
+        </mc:Fallback>
+      </mc:AlternateContent>
     </p:spTree>
     <p:extLst>
       <p:ext uri="{BB962C8B-B14F-4D97-AF65-F5344CB8AC3E}">

</xml_diff>

<commit_message>
Added comments to code. Made minor changes
</commit_message>
<xml_diff>
--- a/Similarity in Ejecta Velocity Of Type Ia Supernovae.pptx
+++ b/Similarity in Ejecta Velocity Of Type Ia Supernovae.pptx
@@ -11482,15 +11482,15 @@
         </p:nvPicPr>
         <p:blipFill>
           <a:blip r:embed="rId2"/>
-          <a:srcRect l="8379" t="1257" r="8237" b="2042"/>
+          <a:srcRect l="8117" t="965" r="9090" b="2034"/>
           <a:stretch>
             <a:fillRect/>
           </a:stretch>
         </p:blipFill>
         <p:spPr>
           <a:xfrm>
-            <a:off x="7005997" y="1228725"/>
-            <a:ext cx="5088032" cy="4339318"/>
+            <a:off x="7062107" y="1183821"/>
+            <a:ext cx="5021037" cy="4441372"/>
           </a:xfrm>
           <a:prstGeom prst="roundRect">
             <a:avLst>

</xml_diff>